<commit_message>
replaced references to Azure Notebooks
</commit_message>
<xml_diff>
--- a/Whiteboard design session/WDS trainer presentation - MLOps.pptx
+++ b/Whiteboard design session/WDS trainer presentation - MLOps.pptx
@@ -235,7 +235,7 @@
           <a:p>
             <a:fld id="{52A13B17-C506-4D51-BB37-16B365906619}" type="datetimeFigureOut">
               <a:rPr lang="en-US" smtClean="0"/>
-              <a:t>12/27/2019</a:t>
+              <a:t>3/18/2020</a:t>
             </a:fld>
             <a:endParaRPr lang="en-US" dirty="0"/>
           </a:p>
@@ -16516,7 +16516,7 @@
       </p:sp>
       <p:pic>
         <p:nvPicPr>
-          <p:cNvPr id="6" name="Picture 5" descr="The architectural diagram of the preferred solution">
+          <p:cNvPr id="6" name="Picture 5">
             <a:extLst>
               <a:ext uri="{FF2B5EF4-FFF2-40B4-BE49-F238E27FC236}">
                 <a16:creationId xmlns:a16="http://schemas.microsoft.com/office/drawing/2014/main" id="{6EC24131-3368-46C1-AF77-2C99F5DCDCFE}"/>
@@ -16536,14 +16536,13 @@
               </a:ext>
             </a:extLst>
           </a:blip>
-          <a:stretch>
-            <a:fillRect/>
-          </a:stretch>
+          <a:srcRect/>
+          <a:stretch/>
         </p:blipFill>
         <p:spPr>
           <a:xfrm>
-            <a:off x="1120302" y="1100003"/>
-            <a:ext cx="9951396" cy="5597660"/>
+            <a:off x="1120302" y="1100689"/>
+            <a:ext cx="9951396" cy="5596287"/>
           </a:xfrm>
           <a:prstGeom prst="rect">
             <a:avLst/>
@@ -16950,7 +16949,15 @@
             </a:pPr>
             <a:r>
               <a:rPr lang="en-US" sz="1800" dirty="0"/>
-              <a:t>For the machine learning phases listed, they could author the machine learning pipeline in Azure Notebooks, which provides a free-to-use notebook environment that can leverage the scalable compute provided by Azure and Azure Machine Learning Compute.</a:t>
+              <a:t>For the machine learning phases listed, they could author the machine learning pipeline </a:t>
+            </a:r>
+            <a:r>
+              <a:rPr lang="en-US" sz="1800"/>
+              <a:t>in a notebook </a:t>
+            </a:r>
+            <a:r>
+              <a:rPr lang="en-US" sz="1800" dirty="0"/>
+              <a:t>environment that can leverage the scalable compute provided by Azure and Azure Machine Learning Compute.</a:t>
             </a:r>
           </a:p>
           <a:p>

</xml_diff>

<commit_message>
minor fixes from final testing round
</commit_message>
<xml_diff>
--- a/Whiteboard design session/WDS trainer presentation - MLOps.pptx
+++ b/Whiteboard design session/WDS trainer presentation - MLOps.pptx
@@ -235,7 +235,7 @@
           <a:p>
             <a:fld id="{52A13B17-C506-4D51-BB37-16B365906619}" type="datetimeFigureOut">
               <a:rPr lang="en-US" smtClean="0"/>
-              <a:t>3/18/2020</a:t>
+              <a:t>3/20/2020</a:t>
             </a:fld>
             <a:endParaRPr lang="en-US" dirty="0"/>
           </a:p>
@@ -17503,13 +17503,20 @@
             </a:r>
           </a:p>
           <a:p>
-            <a:pPr>
-              <a:buFontTx/>
-              <a:buChar char="-"/>
+            <a:pPr marL="0" indent="0">
+              <a:buNone/>
             </a:pPr>
             <a:r>
               <a:rPr lang="en-US" sz="1800" dirty="0"/>
-              <a:t>The second PythonScriptStep references a separate Python script that would evaluate the model's performance and logs the results. </a:t>
+              <a:t>- The second </a:t>
+            </a:r>
+            <a:r>
+              <a:rPr lang="en-US" sz="1800" dirty="0" err="1"/>
+              <a:t>PythonScriptStep</a:t>
+            </a:r>
+            <a:r>
+              <a:rPr lang="en-US" sz="1800" dirty="0"/>
+              <a:t> would reference a separate Python script that evaluates the model's performance and logs the results. </a:t>
             </a:r>
           </a:p>
           <a:p>
@@ -20195,7 +20202,7 @@
           <a:p>
             <a:r>
               <a:rPr lang="en-US" sz="2400" dirty="0"/>
-              <a:t>The component descriptions (which are free form text) are entered and managed via a web application. This web application take new component descriptions entered by authorized technicians and labels the component as compliant or non-compliant based on the text. </a:t>
+              <a:t>The component descriptions (which are free form text) are entered and managed via a web application. This web application takes new component descriptions entered by authorized technicians and labels the components as compliant or non-compliant based on the text. </a:t>
             </a:r>
           </a:p>
           <a:p>
@@ -21664,6 +21671,15 @@
 </file>
 
 <file path=customXml/item1.xml><?xml version="1.0" encoding="utf-8"?>
+<p:properties xmlns:p="http://schemas.microsoft.com/office/2006/metadata/properties" xmlns:xsi="http://www.w3.org/2001/XMLSchema-instance" xmlns:pc="http://schemas.microsoft.com/office/infopath/2007/PartnerControls">
+  <documentManagement>
+    <_ip_UnifiedCompliancePolicyUIAction xmlns="http://schemas.microsoft.com/sharepoint/v3" xsi:nil="true"/>
+    <_ip_UnifiedCompliancePolicyProperties xmlns="http://schemas.microsoft.com/sharepoint/v3" xsi:nil="true"/>
+  </documentManagement>
+</p:properties>
+</file>
+
+<file path=customXml/item2.xml><?xml version="1.0" encoding="utf-8"?>
 <ct:contentTypeSchema xmlns:ct="http://schemas.microsoft.com/office/2006/metadata/contentType" xmlns:ma="http://schemas.microsoft.com/office/2006/metadata/properties/metaAttributes" ct:_="" ma:_="" ma:contentTypeName="Document" ma:contentTypeID="0x010100D15DFA3690A15B4081582BBCC6BEAC3E" ma:contentTypeVersion="9" ma:contentTypeDescription="Create a new document." ma:contentTypeScope="" ma:versionID="642da1784587cbe85a7fdbbe4dc36103">
   <xsd:schema xmlns:xsd="http://www.w3.org/2001/XMLSchema" xmlns:xs="http://www.w3.org/2001/XMLSchema" xmlns:p="http://schemas.microsoft.com/office/2006/metadata/properties" xmlns:ns1="http://schemas.microsoft.com/sharepoint/v3" xmlns:ns2="2023ac63-7b75-4916-a9ee-591457758eee" xmlns:ns3="d9c797ad-d7c3-4982-82b7-81352a75e4a5" targetNamespace="http://schemas.microsoft.com/office/2006/metadata/properties" ma:root="true" ma:fieldsID="91198b0246576053cc55dd2c67035a89" ns1:_="" ns2:_="" ns3:_="">
     <xsd:import namespace="http://schemas.microsoft.com/sharepoint/v3"/>
@@ -21865,15 +21881,6 @@
 </ct:contentTypeSchema>
 </file>
 
-<file path=customXml/item2.xml><?xml version="1.0" encoding="utf-8"?>
-<p:properties xmlns:p="http://schemas.microsoft.com/office/2006/metadata/properties" xmlns:xsi="http://www.w3.org/2001/XMLSchema-instance" xmlns:pc="http://schemas.microsoft.com/office/infopath/2007/PartnerControls">
-  <documentManagement>
-    <_ip_UnifiedCompliancePolicyUIAction xmlns="http://schemas.microsoft.com/sharepoint/v3" xsi:nil="true"/>
-    <_ip_UnifiedCompliancePolicyProperties xmlns="http://schemas.microsoft.com/sharepoint/v3" xsi:nil="true"/>
-  </documentManagement>
-</p:properties>
-</file>
-
 <file path=customXml/item3.xml><?xml version="1.0" encoding="utf-8"?>
 <?mso-contentType ?>
 <FormTemplates xmlns="http://schemas.microsoft.com/sharepoint/v3/contenttype/forms">
@@ -21884,6 +21891,24 @@
 </file>
 
 <file path=customXml/itemProps1.xml><?xml version="1.0" encoding="utf-8"?>
+<ds:datastoreItem xmlns:ds="http://schemas.openxmlformats.org/officeDocument/2006/customXml" ds:itemID="{BAF7D529-36AB-45DA-B239-2F912F2D1610}">
+  <ds:schemaRefs>
+    <ds:schemaRef ds:uri="http://purl.org/dc/terms/"/>
+    <ds:schemaRef ds:uri="http://schemas.microsoft.com/sharepoint/v3"/>
+    <ds:schemaRef ds:uri="http://purl.org/dc/dcmitype/"/>
+    <ds:schemaRef ds:uri="http://schemas.openxmlformats.org/package/2006/metadata/core-properties"/>
+    <ds:schemaRef ds:uri="http://purl.org/dc/elements/1.1/"/>
+    <ds:schemaRef ds:uri="http://schemas.microsoft.com/office/2006/metadata/properties"/>
+    <ds:schemaRef ds:uri="http://schemas.microsoft.com/office/2006/documentManagement/types"/>
+    <ds:schemaRef ds:uri="http://schemas.microsoft.com/office/infopath/2007/PartnerControls"/>
+    <ds:schemaRef ds:uri="d9c797ad-d7c3-4982-82b7-81352a75e4a5"/>
+    <ds:schemaRef ds:uri="2023ac63-7b75-4916-a9ee-591457758eee"/>
+    <ds:schemaRef ds:uri="http://www.w3.org/XML/1998/namespace"/>
+  </ds:schemaRefs>
+</ds:datastoreItem>
+</file>
+
+<file path=customXml/itemProps2.xml><?xml version="1.0" encoding="utf-8"?>
 <ds:datastoreItem xmlns:ds="http://schemas.openxmlformats.org/officeDocument/2006/customXml" ds:itemID="{255F5BEB-6AD6-480A-8556-C80C5EBC10F2}">
   <ds:schemaRefs>
     <ds:schemaRef ds:uri="http://schemas.microsoft.com/office/2006/metadata/contentType"/>
@@ -21903,24 +21928,6 @@
 </ds:datastoreItem>
 </file>
 
-<file path=customXml/itemProps2.xml><?xml version="1.0" encoding="utf-8"?>
-<ds:datastoreItem xmlns:ds="http://schemas.openxmlformats.org/officeDocument/2006/customXml" ds:itemID="{BAF7D529-36AB-45DA-B239-2F912F2D1610}">
-  <ds:schemaRefs>
-    <ds:schemaRef ds:uri="http://purl.org/dc/terms/"/>
-    <ds:schemaRef ds:uri="http://schemas.microsoft.com/sharepoint/v3"/>
-    <ds:schemaRef ds:uri="http://purl.org/dc/dcmitype/"/>
-    <ds:schemaRef ds:uri="http://schemas.openxmlformats.org/package/2006/metadata/core-properties"/>
-    <ds:schemaRef ds:uri="http://purl.org/dc/elements/1.1/"/>
-    <ds:schemaRef ds:uri="http://schemas.microsoft.com/office/2006/metadata/properties"/>
-    <ds:schemaRef ds:uri="http://schemas.microsoft.com/office/2006/documentManagement/types"/>
-    <ds:schemaRef ds:uri="http://schemas.microsoft.com/office/infopath/2007/PartnerControls"/>
-    <ds:schemaRef ds:uri="d9c797ad-d7c3-4982-82b7-81352a75e4a5"/>
-    <ds:schemaRef ds:uri="2023ac63-7b75-4916-a9ee-591457758eee"/>
-    <ds:schemaRef ds:uri="http://www.w3.org/XML/1998/namespace"/>
-  </ds:schemaRefs>
-</ds:datastoreItem>
-</file>
-
 <file path=customXml/itemProps3.xml><?xml version="1.0" encoding="utf-8"?>
 <ds:datastoreItem xmlns:ds="http://schemas.openxmlformats.org/officeDocument/2006/customXml" ds:itemID="{F18501AF-04CF-4482-BAE1-607B49DDC378}">
   <ds:schemaRefs>

</xml_diff>

<commit_message>
QC Review of March 2020 update.
</commit_message>
<xml_diff>
--- a/Whiteboard design session/WDS trainer presentation - MLOps.pptx
+++ b/Whiteboard design session/WDS trainer presentation - MLOps.pptx
@@ -235,7 +235,7 @@
           <a:p>
             <a:fld id="{52A13B17-C506-4D51-BB37-16B365906619}" type="datetimeFigureOut">
               <a:rPr lang="en-US" smtClean="0"/>
-              <a:t>3/20/2020</a:t>
+              <a:t>3/21/2020</a:t>
             </a:fld>
             <a:endParaRPr lang="en-US" dirty="0"/>
           </a:p>
@@ -16516,7 +16516,7 @@
       </p:sp>
       <p:pic>
         <p:nvPicPr>
-          <p:cNvPr id="6" name="Picture 5">
+          <p:cNvPr id="6" name="Picture 5" descr="A pipeline is triggered based on a change in the Machine Learning environment. This pipeline goes through the process of building new artifacts and updating container registries with new models and services which are deployed to ACS or Kubernetes for consumption.">
             <a:extLst>
               <a:ext uri="{FF2B5EF4-FFF2-40B4-BE49-F238E27FC236}">
                 <a16:creationId xmlns:a16="http://schemas.microsoft.com/office/drawing/2014/main" id="{6EC24131-3368-46C1-AF77-2C99F5DCDCFE}"/>
@@ -21671,15 +21671,6 @@
 </file>
 
 <file path=customXml/item1.xml><?xml version="1.0" encoding="utf-8"?>
-<p:properties xmlns:p="http://schemas.microsoft.com/office/2006/metadata/properties" xmlns:xsi="http://www.w3.org/2001/XMLSchema-instance" xmlns:pc="http://schemas.microsoft.com/office/infopath/2007/PartnerControls">
-  <documentManagement>
-    <_ip_UnifiedCompliancePolicyUIAction xmlns="http://schemas.microsoft.com/sharepoint/v3" xsi:nil="true"/>
-    <_ip_UnifiedCompliancePolicyProperties xmlns="http://schemas.microsoft.com/sharepoint/v3" xsi:nil="true"/>
-  </documentManagement>
-</p:properties>
-</file>
-
-<file path=customXml/item2.xml><?xml version="1.0" encoding="utf-8"?>
 <ct:contentTypeSchema xmlns:ct="http://schemas.microsoft.com/office/2006/metadata/contentType" xmlns:ma="http://schemas.microsoft.com/office/2006/metadata/properties/metaAttributes" ct:_="" ma:_="" ma:contentTypeName="Document" ma:contentTypeID="0x010100D15DFA3690A15B4081582BBCC6BEAC3E" ma:contentTypeVersion="9" ma:contentTypeDescription="Create a new document." ma:contentTypeScope="" ma:versionID="642da1784587cbe85a7fdbbe4dc36103">
   <xsd:schema xmlns:xsd="http://www.w3.org/2001/XMLSchema" xmlns:xs="http://www.w3.org/2001/XMLSchema" xmlns:p="http://schemas.microsoft.com/office/2006/metadata/properties" xmlns:ns1="http://schemas.microsoft.com/sharepoint/v3" xmlns:ns2="2023ac63-7b75-4916-a9ee-591457758eee" xmlns:ns3="d9c797ad-d7c3-4982-82b7-81352a75e4a5" targetNamespace="http://schemas.microsoft.com/office/2006/metadata/properties" ma:root="true" ma:fieldsID="91198b0246576053cc55dd2c67035a89" ns1:_="" ns2:_="" ns3:_="">
     <xsd:import namespace="http://schemas.microsoft.com/sharepoint/v3"/>
@@ -21881,6 +21872,15 @@
 </ct:contentTypeSchema>
 </file>
 
+<file path=customXml/item2.xml><?xml version="1.0" encoding="utf-8"?>
+<p:properties xmlns:p="http://schemas.microsoft.com/office/2006/metadata/properties" xmlns:xsi="http://www.w3.org/2001/XMLSchema-instance" xmlns:pc="http://schemas.microsoft.com/office/infopath/2007/PartnerControls">
+  <documentManagement>
+    <_ip_UnifiedCompliancePolicyUIAction xmlns="http://schemas.microsoft.com/sharepoint/v3" xsi:nil="true"/>
+    <_ip_UnifiedCompliancePolicyProperties xmlns="http://schemas.microsoft.com/sharepoint/v3" xsi:nil="true"/>
+  </documentManagement>
+</p:properties>
+</file>
+
 <file path=customXml/item3.xml><?xml version="1.0" encoding="utf-8"?>
 <?mso-contentType ?>
 <FormTemplates xmlns="http://schemas.microsoft.com/sharepoint/v3/contenttype/forms">
@@ -21891,24 +21891,6 @@
 </file>
 
 <file path=customXml/itemProps1.xml><?xml version="1.0" encoding="utf-8"?>
-<ds:datastoreItem xmlns:ds="http://schemas.openxmlformats.org/officeDocument/2006/customXml" ds:itemID="{BAF7D529-36AB-45DA-B239-2F912F2D1610}">
-  <ds:schemaRefs>
-    <ds:schemaRef ds:uri="http://purl.org/dc/terms/"/>
-    <ds:schemaRef ds:uri="http://schemas.microsoft.com/sharepoint/v3"/>
-    <ds:schemaRef ds:uri="http://purl.org/dc/dcmitype/"/>
-    <ds:schemaRef ds:uri="http://schemas.openxmlformats.org/package/2006/metadata/core-properties"/>
-    <ds:schemaRef ds:uri="http://purl.org/dc/elements/1.1/"/>
-    <ds:schemaRef ds:uri="http://schemas.microsoft.com/office/2006/metadata/properties"/>
-    <ds:schemaRef ds:uri="http://schemas.microsoft.com/office/2006/documentManagement/types"/>
-    <ds:schemaRef ds:uri="http://schemas.microsoft.com/office/infopath/2007/PartnerControls"/>
-    <ds:schemaRef ds:uri="d9c797ad-d7c3-4982-82b7-81352a75e4a5"/>
-    <ds:schemaRef ds:uri="2023ac63-7b75-4916-a9ee-591457758eee"/>
-    <ds:schemaRef ds:uri="http://www.w3.org/XML/1998/namespace"/>
-  </ds:schemaRefs>
-</ds:datastoreItem>
-</file>
-
-<file path=customXml/itemProps2.xml><?xml version="1.0" encoding="utf-8"?>
 <ds:datastoreItem xmlns:ds="http://schemas.openxmlformats.org/officeDocument/2006/customXml" ds:itemID="{255F5BEB-6AD6-480A-8556-C80C5EBC10F2}">
   <ds:schemaRefs>
     <ds:schemaRef ds:uri="http://schemas.microsoft.com/office/2006/metadata/contentType"/>
@@ -21928,6 +21910,24 @@
 </ds:datastoreItem>
 </file>
 
+<file path=customXml/itemProps2.xml><?xml version="1.0" encoding="utf-8"?>
+<ds:datastoreItem xmlns:ds="http://schemas.openxmlformats.org/officeDocument/2006/customXml" ds:itemID="{BAF7D529-36AB-45DA-B239-2F912F2D1610}">
+  <ds:schemaRefs>
+    <ds:schemaRef ds:uri="http://purl.org/dc/terms/"/>
+    <ds:schemaRef ds:uri="http://schemas.microsoft.com/sharepoint/v3"/>
+    <ds:schemaRef ds:uri="http://purl.org/dc/dcmitype/"/>
+    <ds:schemaRef ds:uri="http://schemas.openxmlformats.org/package/2006/metadata/core-properties"/>
+    <ds:schemaRef ds:uri="http://purl.org/dc/elements/1.1/"/>
+    <ds:schemaRef ds:uri="http://schemas.microsoft.com/office/2006/metadata/properties"/>
+    <ds:schemaRef ds:uri="http://schemas.microsoft.com/office/2006/documentManagement/types"/>
+    <ds:schemaRef ds:uri="http://schemas.microsoft.com/office/infopath/2007/PartnerControls"/>
+    <ds:schemaRef ds:uri="d9c797ad-d7c3-4982-82b7-81352a75e4a5"/>
+    <ds:schemaRef ds:uri="2023ac63-7b75-4916-a9ee-591457758eee"/>
+    <ds:schemaRef ds:uri="http://www.w3.org/XML/1998/namespace"/>
+  </ds:schemaRefs>
+</ds:datastoreItem>
+</file>
+
 <file path=customXml/itemProps3.xml><?xml version="1.0" encoding="utf-8"?>
 <ds:datastoreItem xmlns:ds="http://schemas.openxmlformats.org/officeDocument/2006/customXml" ds:itemID="{F18501AF-04CF-4482-BAE1-607B49DDC378}">
   <ds:schemaRefs>

</xml_diff>